<commit_message>
Cambios de la persistencia de el dashboard
</commit_message>
<xml_diff>
--- a/Presentacion_IoT_Completa.pptx
+++ b/Presentacion_IoT_Completa.pptx
@@ -5,7 +5,7 @@
     <p:sldMasterId id="2147483648" r:id="rId1"/>
   </p:sldMasterIdLst>
   <p:notesMasterIdLst>
-    <p:notesMasterId r:id="rId20"/>
+    <p:notesMasterId r:id="rId18"/>
   </p:notesMasterIdLst>
   <p:sldIdLst>
     <p:sldId id="256" r:id="rId2"/>
@@ -21,11 +21,9 @@
     <p:sldId id="266" r:id="rId12"/>
     <p:sldId id="267" r:id="rId13"/>
     <p:sldId id="268" r:id="rId14"/>
-    <p:sldId id="269" r:id="rId15"/>
-    <p:sldId id="270" r:id="rId16"/>
-    <p:sldId id="271" r:id="rId17"/>
-    <p:sldId id="272" r:id="rId18"/>
-    <p:sldId id="273" r:id="rId19"/>
+    <p:sldId id="271" r:id="rId15"/>
+    <p:sldId id="272" r:id="rId16"/>
+    <p:sldId id="273" r:id="rId17"/>
   </p:sldIdLst>
   <p:sldSz cx="9144000" cy="5143500" type="screen16x9"/>
   <p:notesSz cx="5143500" cy="9144000"/>
@@ -964,188 +962,6 @@
             <a:fld id="{F7021451-1387-4CA6-816F-3879F97B5CBC}" type="slidenum">
               <a:rPr lang="en-US"/>
               <a:t>16</a:t>
-            </a:fld>
-            <a:endParaRPr lang="en-US"/>
-          </a:p>
-        </p:txBody>
-      </p:sp>
-    </p:spTree>
-    <p:extLst>
-      <p:ext uri="{BB962C8B-B14F-4D97-AF65-F5344CB8AC3E}">
-        <p14:creationId xmlns:p14="http://schemas.microsoft.com/office/powerpoint/2010/main" val="1024086991"/>
-      </p:ext>
-    </p:extLst>
-  </p:cSld>
-  <p:clrMapOvr>
-    <a:masterClrMapping/>
-  </p:clrMapOvr>
-</p:notes>
-</file>
-
-<file path=ppt/notesSlides/notesSlide17.xml><?xml version="1.0" encoding="utf-8"?>
-<p:notes xmlns:a="http://schemas.openxmlformats.org/drawingml/2006/main" xmlns:r="http://schemas.openxmlformats.org/officeDocument/2006/relationships" xmlns:p="http://schemas.openxmlformats.org/presentationml/2006/main">
-  <p:cSld>
-    <p:spTree>
-      <p:nvGrpSpPr>
-        <p:cNvPr id="1" name=""/>
-        <p:cNvGrpSpPr/>
-        <p:nvPr/>
-      </p:nvGrpSpPr>
-      <p:grpSpPr>
-        <a:xfrm>
-          <a:off x="0" y="0"/>
-          <a:ext cx="0" cy="0"/>
-          <a:chOff x="0" y="0"/>
-          <a:chExt cx="0" cy="0"/>
-        </a:xfrm>
-      </p:grpSpPr>
-      <p:sp>
-        <p:nvSpPr>
-          <p:cNvPr id="2" name="Slide Image Placeholder 1"/>
-          <p:cNvSpPr>
-            <a:spLocks noGrp="1" noRot="1" noChangeAspect="1"/>
-          </p:cNvSpPr>
-          <p:nvPr>
-            <p:ph type="sldImg"/>
-          </p:nvPr>
-        </p:nvSpPr>
-        <p:spPr/>
-        <p:txBody>
-          <a:bodyPr/>
-          <a:lstStyle/>
-          <a:p>
-            <a:endParaRPr lang="es-ES"/>
-          </a:p>
-        </p:txBody>
-      </p:sp>
-      <p:sp>
-        <p:nvSpPr>
-          <p:cNvPr id="3" name="Notes Placeholder 2"/>
-          <p:cNvSpPr>
-            <a:spLocks noGrp="1"/>
-          </p:cNvSpPr>
-          <p:nvPr>
-            <p:ph type="body" idx="1"/>
-          </p:nvPr>
-        </p:nvSpPr>
-        <p:spPr/>
-        <p:txBody>
-          <a:bodyPr/>
-          <a:lstStyle/>
-          <a:p>
-            <a:endParaRPr lang="en-US" dirty="0"/>
-          </a:p>
-        </p:txBody>
-      </p:sp>
-      <p:sp>
-        <p:nvSpPr>
-          <p:cNvPr id="4" name="Slide Number Placeholder 3"/>
-          <p:cNvSpPr>
-            <a:spLocks noGrp="1"/>
-          </p:cNvSpPr>
-          <p:nvPr>
-            <p:ph type="sldNum" sz="quarter" idx="10"/>
-          </p:nvPr>
-        </p:nvSpPr>
-        <p:spPr/>
-        <p:txBody>
-          <a:bodyPr/>
-          <a:lstStyle/>
-          <a:p>
-            <a:fld id="{F7021451-1387-4CA6-816F-3879F97B5CBC}" type="slidenum">
-              <a:rPr lang="en-US"/>
-              <a:t>17</a:t>
-            </a:fld>
-            <a:endParaRPr lang="en-US"/>
-          </a:p>
-        </p:txBody>
-      </p:sp>
-    </p:spTree>
-    <p:extLst>
-      <p:ext uri="{BB962C8B-B14F-4D97-AF65-F5344CB8AC3E}">
-        <p14:creationId xmlns:p14="http://schemas.microsoft.com/office/powerpoint/2010/main" val="1024086991"/>
-      </p:ext>
-    </p:extLst>
-  </p:cSld>
-  <p:clrMapOvr>
-    <a:masterClrMapping/>
-  </p:clrMapOvr>
-</p:notes>
-</file>
-
-<file path=ppt/notesSlides/notesSlide18.xml><?xml version="1.0" encoding="utf-8"?>
-<p:notes xmlns:a="http://schemas.openxmlformats.org/drawingml/2006/main" xmlns:r="http://schemas.openxmlformats.org/officeDocument/2006/relationships" xmlns:p="http://schemas.openxmlformats.org/presentationml/2006/main">
-  <p:cSld>
-    <p:spTree>
-      <p:nvGrpSpPr>
-        <p:cNvPr id="1" name=""/>
-        <p:cNvGrpSpPr/>
-        <p:nvPr/>
-      </p:nvGrpSpPr>
-      <p:grpSpPr>
-        <a:xfrm>
-          <a:off x="0" y="0"/>
-          <a:ext cx="0" cy="0"/>
-          <a:chOff x="0" y="0"/>
-          <a:chExt cx="0" cy="0"/>
-        </a:xfrm>
-      </p:grpSpPr>
-      <p:sp>
-        <p:nvSpPr>
-          <p:cNvPr id="2" name="Slide Image Placeholder 1"/>
-          <p:cNvSpPr>
-            <a:spLocks noGrp="1" noRot="1" noChangeAspect="1"/>
-          </p:cNvSpPr>
-          <p:nvPr>
-            <p:ph type="sldImg"/>
-          </p:nvPr>
-        </p:nvSpPr>
-        <p:spPr/>
-        <p:txBody>
-          <a:bodyPr/>
-          <a:lstStyle/>
-          <a:p>
-            <a:endParaRPr lang="es-ES"/>
-          </a:p>
-        </p:txBody>
-      </p:sp>
-      <p:sp>
-        <p:nvSpPr>
-          <p:cNvPr id="3" name="Notes Placeholder 2"/>
-          <p:cNvSpPr>
-            <a:spLocks noGrp="1"/>
-          </p:cNvSpPr>
-          <p:nvPr>
-            <p:ph type="body" idx="1"/>
-          </p:nvPr>
-        </p:nvSpPr>
-        <p:spPr/>
-        <p:txBody>
-          <a:bodyPr/>
-          <a:lstStyle/>
-          <a:p>
-            <a:endParaRPr lang="en-US" dirty="0"/>
-          </a:p>
-        </p:txBody>
-      </p:sp>
-      <p:sp>
-        <p:nvSpPr>
-          <p:cNvPr id="4" name="Slide Number Placeholder 3"/>
-          <p:cNvSpPr>
-            <a:spLocks noGrp="1"/>
-          </p:cNvSpPr>
-          <p:nvPr>
-            <p:ph type="sldNum" sz="quarter" idx="10"/>
-          </p:nvPr>
-        </p:nvSpPr>
-        <p:spPr/>
-        <p:txBody>
-          <a:bodyPr/>
-          <a:lstStyle/>
-          <a:p>
-            <a:fld id="{F7021451-1387-4CA6-816F-3879F97B5CBC}" type="slidenum">
-              <a:rPr lang="en-US"/>
-              <a:t>18</a:t>
             </a:fld>
             <a:endParaRPr lang="en-US"/>
           </a:p>
@@ -2518,7 +2334,7 @@
                   <a:srgbClr val="1E293B"/>
                 </a:solidFill>
               </a:rPr>
-              <a:t>🐛 Problemas Encontrados (1/2)</a:t>
+              <a:t>Problemas Encontrados (1/2)</a:t>
             </a:r>
             <a:endParaRPr lang="es-ES" sz="3600" noProof="0" dirty="0"/>
           </a:p>
@@ -3223,7 +3039,7 @@
                   <a:srgbClr val="1E293B"/>
                 </a:solidFill>
               </a:rPr>
-              <a:t>🐛 Problemas Encontrados (2/2)</a:t>
+              <a:t>Problemas Encontrados (2/2)</a:t>
             </a:r>
             <a:endParaRPr lang="es-ES" sz="3600" noProof="0" dirty="0"/>
           </a:p>
@@ -4858,7 +4674,7 @@
                   <a:srgbClr val="02C39A"/>
                 </a:solidFill>
               </a:rPr>
-              <a:t>🎬 DEMO</a:t>
+              <a:t>DEMO</a:t>
             </a:r>
             <a:endParaRPr lang="es-ES" sz="5400" noProof="0" dirty="0"/>
           </a:p>
@@ -4969,1897 +4785,6 @@
 </file>
 
 <file path=ppt/slides/slide14.xml><?xml version="1.0" encoding="utf-8"?>
-<p:sld xmlns:a="http://schemas.openxmlformats.org/drawingml/2006/main" xmlns:r="http://schemas.openxmlformats.org/officeDocument/2006/relationships" xmlns:p="http://schemas.openxmlformats.org/presentationml/2006/main">
-  <p:cSld name="Slide 14">
-    <p:bg>
-      <p:bgPr>
-        <a:solidFill>
-          <a:srgbClr val="F8FAFC"/>
-        </a:solidFill>
-        <a:effectLst/>
-      </p:bgPr>
-    </p:bg>
-    <p:spTree>
-      <p:nvGrpSpPr>
-        <p:cNvPr id="1" name=""/>
-        <p:cNvGrpSpPr/>
-        <p:nvPr/>
-      </p:nvGrpSpPr>
-      <p:grpSpPr>
-        <a:xfrm>
-          <a:off x="0" y="0"/>
-          <a:ext cx="0" cy="0"/>
-          <a:chOff x="0" y="0"/>
-          <a:chExt cx="0" cy="0"/>
-        </a:xfrm>
-      </p:grpSpPr>
-      <p:sp>
-        <p:nvSpPr>
-          <p:cNvPr id="2" name="Text 0"/>
-          <p:cNvSpPr/>
-          <p:nvPr/>
-        </p:nvSpPr>
-        <p:spPr>
-          <a:xfrm>
-            <a:off x="457200" y="365760"/>
-            <a:ext cx="8229600" cy="548640"/>
-          </a:xfrm>
-          <a:prstGeom prst="rect">
-            <a:avLst/>
-          </a:prstGeom>
-          <a:noFill/>
-          <a:ln/>
-        </p:spPr>
-        <p:txBody>
-          <a:bodyPr wrap="square" lIns="0" tIns="0" rIns="0" bIns="0" rtlCol="0" anchor="ctr"/>
-          <a:lstStyle/>
-          <a:p>
-            <a:pPr marL="0" indent="0">
-              <a:buNone/>
-            </a:pPr>
-            <a:r>
-              <a:rPr lang="es-ES" sz="3600" b="1" noProof="0" dirty="0">
-                <a:solidFill>
-                  <a:srgbClr val="1E293B"/>
-                </a:solidFill>
-              </a:rPr>
-              <a:t>Resultados</a:t>
-            </a:r>
-            <a:endParaRPr lang="es-ES" sz="3600" noProof="0" dirty="0"/>
-          </a:p>
-        </p:txBody>
-      </p:sp>
-      <p:sp>
-        <p:nvSpPr>
-          <p:cNvPr id="3" name="Shape 1"/>
-          <p:cNvSpPr/>
-          <p:nvPr/>
-        </p:nvSpPr>
-        <p:spPr>
-          <a:xfrm>
-            <a:off x="914400" y="1371600"/>
-            <a:ext cx="1645920" cy="1097280"/>
-          </a:xfrm>
-          <a:prstGeom prst="rect">
-            <a:avLst/>
-          </a:prstGeom>
-          <a:solidFill>
-            <a:srgbClr val="FFFFFF"/>
-          </a:solidFill>
-          <a:ln w="38100">
-            <a:solidFill>
-              <a:srgbClr val="028090"/>
-            </a:solidFill>
-            <a:prstDash val="solid"/>
-          </a:ln>
-        </p:spPr>
-        <p:txBody>
-          <a:bodyPr/>
-          <a:lstStyle/>
-          <a:p>
-            <a:endParaRPr lang="es-ES" noProof="0" dirty="0"/>
-          </a:p>
-        </p:txBody>
-      </p:sp>
-      <p:sp>
-        <p:nvSpPr>
-          <p:cNvPr id="4" name="Text 2"/>
-          <p:cNvSpPr/>
-          <p:nvPr/>
-        </p:nvSpPr>
-        <p:spPr>
-          <a:xfrm>
-            <a:off x="914400" y="1554480"/>
-            <a:ext cx="1645920" cy="457200"/>
-          </a:xfrm>
-          <a:prstGeom prst="rect">
-            <a:avLst/>
-          </a:prstGeom>
-          <a:noFill/>
-          <a:ln/>
-        </p:spPr>
-        <p:txBody>
-          <a:bodyPr wrap="square" rtlCol="0" anchor="ctr"/>
-          <a:lstStyle/>
-          <a:p>
-            <a:pPr marL="0" indent="0" algn="ctr">
-              <a:buNone/>
-            </a:pPr>
-            <a:r>
-              <a:rPr lang="es-ES" sz="3200" b="1" noProof="0" dirty="0">
-                <a:solidFill>
-                  <a:srgbClr val="028090"/>
-                </a:solidFill>
-              </a:rPr>
-              <a:t>~150</a:t>
-            </a:r>
-            <a:endParaRPr lang="es-ES" sz="3200" noProof="0" dirty="0"/>
-          </a:p>
-        </p:txBody>
-      </p:sp>
-      <p:sp>
-        <p:nvSpPr>
-          <p:cNvPr id="5" name="Text 3"/>
-          <p:cNvSpPr/>
-          <p:nvPr/>
-        </p:nvSpPr>
-        <p:spPr>
-          <a:xfrm>
-            <a:off x="914400" y="2103120"/>
-            <a:ext cx="1645920" cy="274320"/>
-          </a:xfrm>
-          <a:prstGeom prst="rect">
-            <a:avLst/>
-          </a:prstGeom>
-          <a:noFill/>
-          <a:ln/>
-        </p:spPr>
-        <p:txBody>
-          <a:bodyPr wrap="square" rtlCol="0" anchor="ctr"/>
-          <a:lstStyle/>
-          <a:p>
-            <a:pPr marL="0" indent="0" algn="ctr">
-              <a:buNone/>
-            </a:pPr>
-            <a:r>
-              <a:rPr lang="es-ES" sz="1100" noProof="0" dirty="0">
-                <a:solidFill>
-                  <a:srgbClr val="64748B"/>
-                </a:solidFill>
-              </a:rPr>
-              <a:t>Líneas de código</a:t>
-            </a:r>
-            <a:endParaRPr lang="es-ES" sz="1100" noProof="0" dirty="0"/>
-          </a:p>
-        </p:txBody>
-      </p:sp>
-      <p:sp>
-        <p:nvSpPr>
-          <p:cNvPr id="6" name="Shape 4"/>
-          <p:cNvSpPr/>
-          <p:nvPr/>
-        </p:nvSpPr>
-        <p:spPr>
-          <a:xfrm>
-            <a:off x="2926080" y="1371600"/>
-            <a:ext cx="1645920" cy="1097280"/>
-          </a:xfrm>
-          <a:prstGeom prst="rect">
-            <a:avLst/>
-          </a:prstGeom>
-          <a:solidFill>
-            <a:srgbClr val="FFFFFF"/>
-          </a:solidFill>
-          <a:ln w="38100">
-            <a:solidFill>
-              <a:srgbClr val="00A896"/>
-            </a:solidFill>
-            <a:prstDash val="solid"/>
-          </a:ln>
-        </p:spPr>
-        <p:txBody>
-          <a:bodyPr/>
-          <a:lstStyle/>
-          <a:p>
-            <a:endParaRPr lang="es-ES" noProof="0" dirty="0"/>
-          </a:p>
-        </p:txBody>
-      </p:sp>
-      <p:sp>
-        <p:nvSpPr>
-          <p:cNvPr id="7" name="Text 5"/>
-          <p:cNvSpPr/>
-          <p:nvPr/>
-        </p:nvSpPr>
-        <p:spPr>
-          <a:xfrm>
-            <a:off x="2926080" y="1554480"/>
-            <a:ext cx="1645920" cy="457200"/>
-          </a:xfrm>
-          <a:prstGeom prst="rect">
-            <a:avLst/>
-          </a:prstGeom>
-          <a:noFill/>
-          <a:ln/>
-        </p:spPr>
-        <p:txBody>
-          <a:bodyPr wrap="square" rtlCol="0" anchor="ctr"/>
-          <a:lstStyle/>
-          <a:p>
-            <a:pPr marL="0" indent="0" algn="ctr">
-              <a:buNone/>
-            </a:pPr>
-            <a:r>
-              <a:rPr lang="es-ES" sz="3200" b="1" noProof="0" dirty="0">
-                <a:solidFill>
-                  <a:srgbClr val="00A896"/>
-                </a:solidFill>
-              </a:rPr>
-              <a:t>3</a:t>
-            </a:r>
-            <a:endParaRPr lang="es-ES" sz="3200" noProof="0" dirty="0"/>
-          </a:p>
-        </p:txBody>
-      </p:sp>
-      <p:sp>
-        <p:nvSpPr>
-          <p:cNvPr id="8" name="Text 6"/>
-          <p:cNvSpPr/>
-          <p:nvPr/>
-        </p:nvSpPr>
-        <p:spPr>
-          <a:xfrm>
-            <a:off x="2926080" y="2103120"/>
-            <a:ext cx="1645920" cy="274320"/>
-          </a:xfrm>
-          <a:prstGeom prst="rect">
-            <a:avLst/>
-          </a:prstGeom>
-          <a:noFill/>
-          <a:ln/>
-        </p:spPr>
-        <p:txBody>
-          <a:bodyPr wrap="square" rtlCol="0" anchor="ctr"/>
-          <a:lstStyle/>
-          <a:p>
-            <a:pPr marL="0" indent="0" algn="ctr">
-              <a:buNone/>
-            </a:pPr>
-            <a:r>
-              <a:rPr lang="es-ES" sz="1100" noProof="0" dirty="0">
-                <a:solidFill>
-                  <a:srgbClr val="64748B"/>
-                </a:solidFill>
-              </a:rPr>
-              <a:t>Contenedores</a:t>
-            </a:r>
-            <a:endParaRPr lang="es-ES" sz="1100" noProof="0" dirty="0"/>
-          </a:p>
-        </p:txBody>
-      </p:sp>
-      <p:sp>
-        <p:nvSpPr>
-          <p:cNvPr id="9" name="Shape 7"/>
-          <p:cNvSpPr/>
-          <p:nvPr/>
-        </p:nvSpPr>
-        <p:spPr>
-          <a:xfrm>
-            <a:off x="4937760" y="1371600"/>
-            <a:ext cx="1645920" cy="1097280"/>
-          </a:xfrm>
-          <a:prstGeom prst="rect">
-            <a:avLst/>
-          </a:prstGeom>
-          <a:solidFill>
-            <a:srgbClr val="FFFFFF"/>
-          </a:solidFill>
-          <a:ln w="38100">
-            <a:solidFill>
-              <a:srgbClr val="02C39A"/>
-            </a:solidFill>
-            <a:prstDash val="solid"/>
-          </a:ln>
-        </p:spPr>
-        <p:txBody>
-          <a:bodyPr/>
-          <a:lstStyle/>
-          <a:p>
-            <a:endParaRPr lang="es-ES" noProof="0" dirty="0"/>
-          </a:p>
-        </p:txBody>
-      </p:sp>
-      <p:sp>
-        <p:nvSpPr>
-          <p:cNvPr id="10" name="Text 8"/>
-          <p:cNvSpPr/>
-          <p:nvPr/>
-        </p:nvSpPr>
-        <p:spPr>
-          <a:xfrm>
-            <a:off x="4937760" y="1554480"/>
-            <a:ext cx="1645920" cy="457200"/>
-          </a:xfrm>
-          <a:prstGeom prst="rect">
-            <a:avLst/>
-          </a:prstGeom>
-          <a:noFill/>
-          <a:ln/>
-        </p:spPr>
-        <p:txBody>
-          <a:bodyPr wrap="square" rtlCol="0" anchor="ctr"/>
-          <a:lstStyle/>
-          <a:p>
-            <a:pPr marL="0" indent="0" algn="ctr">
-              <a:buNone/>
-            </a:pPr>
-            <a:r>
-              <a:rPr lang="es-ES" sz="3200" b="1" noProof="0" dirty="0">
-                <a:solidFill>
-                  <a:srgbClr val="02C39A"/>
-                </a:solidFill>
-              </a:rPr>
-              <a:t>&lt;2 min</a:t>
-            </a:r>
-            <a:endParaRPr lang="es-ES" sz="3200" noProof="0" dirty="0"/>
-          </a:p>
-        </p:txBody>
-      </p:sp>
-      <p:sp>
-        <p:nvSpPr>
-          <p:cNvPr id="11" name="Text 9"/>
-          <p:cNvSpPr/>
-          <p:nvPr/>
-        </p:nvSpPr>
-        <p:spPr>
-          <a:xfrm>
-            <a:off x="4937760" y="2103120"/>
-            <a:ext cx="1645920" cy="274320"/>
-          </a:xfrm>
-          <a:prstGeom prst="rect">
-            <a:avLst/>
-          </a:prstGeom>
-          <a:noFill/>
-          <a:ln/>
-        </p:spPr>
-        <p:txBody>
-          <a:bodyPr wrap="square" rtlCol="0" anchor="ctr"/>
-          <a:lstStyle/>
-          <a:p>
-            <a:pPr marL="0" indent="0" algn="ctr">
-              <a:buNone/>
-            </a:pPr>
-            <a:r>
-              <a:rPr lang="es-ES" sz="1100" noProof="0" dirty="0">
-                <a:solidFill>
-                  <a:srgbClr val="64748B"/>
-                </a:solidFill>
-              </a:rPr>
-              <a:t>Tiempo de despliegue</a:t>
-            </a:r>
-            <a:endParaRPr lang="es-ES" sz="1100" noProof="0" dirty="0"/>
-          </a:p>
-        </p:txBody>
-      </p:sp>
-      <p:sp>
-        <p:nvSpPr>
-          <p:cNvPr id="12" name="Shape 10"/>
-          <p:cNvSpPr/>
-          <p:nvPr/>
-        </p:nvSpPr>
-        <p:spPr>
-          <a:xfrm>
-            <a:off x="6949440" y="1371600"/>
-            <a:ext cx="1645920" cy="1097280"/>
-          </a:xfrm>
-          <a:prstGeom prst="rect">
-            <a:avLst/>
-          </a:prstGeom>
-          <a:solidFill>
-            <a:srgbClr val="FFFFFF"/>
-          </a:solidFill>
-          <a:ln w="38100">
-            <a:solidFill>
-              <a:srgbClr val="10B981"/>
-            </a:solidFill>
-            <a:prstDash val="solid"/>
-          </a:ln>
-        </p:spPr>
-        <p:txBody>
-          <a:bodyPr/>
-          <a:lstStyle/>
-          <a:p>
-            <a:endParaRPr lang="es-ES" noProof="0" dirty="0"/>
-          </a:p>
-        </p:txBody>
-      </p:sp>
-      <p:sp>
-        <p:nvSpPr>
-          <p:cNvPr id="13" name="Text 11"/>
-          <p:cNvSpPr/>
-          <p:nvPr/>
-        </p:nvSpPr>
-        <p:spPr>
-          <a:xfrm>
-            <a:off x="6949440" y="1554480"/>
-            <a:ext cx="1645920" cy="457200"/>
-          </a:xfrm>
-          <a:prstGeom prst="rect">
-            <a:avLst/>
-          </a:prstGeom>
-          <a:noFill/>
-          <a:ln/>
-        </p:spPr>
-        <p:txBody>
-          <a:bodyPr wrap="square" rtlCol="0" anchor="ctr"/>
-          <a:lstStyle/>
-          <a:p>
-            <a:pPr marL="0" indent="0" algn="ctr">
-              <a:buNone/>
-            </a:pPr>
-            <a:r>
-              <a:rPr lang="es-ES" sz="3200" b="1" noProof="0" dirty="0">
-                <a:solidFill>
-                  <a:srgbClr val="10B981"/>
-                </a:solidFill>
-              </a:rPr>
-              <a:t>12/min</a:t>
-            </a:r>
-            <a:endParaRPr lang="es-ES" sz="3200" noProof="0" dirty="0"/>
-          </a:p>
-        </p:txBody>
-      </p:sp>
-      <p:sp>
-        <p:nvSpPr>
-          <p:cNvPr id="14" name="Text 12"/>
-          <p:cNvSpPr/>
-          <p:nvPr/>
-        </p:nvSpPr>
-        <p:spPr>
-          <a:xfrm>
-            <a:off x="6949440" y="2103120"/>
-            <a:ext cx="1645920" cy="274320"/>
-          </a:xfrm>
-          <a:prstGeom prst="rect">
-            <a:avLst/>
-          </a:prstGeom>
-          <a:noFill/>
-          <a:ln/>
-        </p:spPr>
-        <p:txBody>
-          <a:bodyPr wrap="square" rtlCol="0" anchor="ctr"/>
-          <a:lstStyle/>
-          <a:p>
-            <a:pPr marL="0" indent="0" algn="ctr">
-              <a:buNone/>
-            </a:pPr>
-            <a:r>
-              <a:rPr lang="es-ES" sz="1100" noProof="0" dirty="0">
-                <a:solidFill>
-                  <a:srgbClr val="64748B"/>
-                </a:solidFill>
-              </a:rPr>
-              <a:t>Datos capturados</a:t>
-            </a:r>
-            <a:endParaRPr lang="es-ES" sz="1100" noProof="0" dirty="0"/>
-          </a:p>
-        </p:txBody>
-      </p:sp>
-      <p:sp>
-        <p:nvSpPr>
-          <p:cNvPr id="15" name="Text 13"/>
-          <p:cNvSpPr/>
-          <p:nvPr/>
-        </p:nvSpPr>
-        <p:spPr>
-          <a:xfrm>
-            <a:off x="731520" y="2743200"/>
-            <a:ext cx="7680960" cy="274320"/>
-          </a:xfrm>
-          <a:prstGeom prst="rect">
-            <a:avLst/>
-          </a:prstGeom>
-          <a:noFill/>
-          <a:ln/>
-        </p:spPr>
-        <p:txBody>
-          <a:bodyPr wrap="square" rtlCol="0" anchor="ctr"/>
-          <a:lstStyle/>
-          <a:p>
-            <a:pPr marL="0" indent="0">
-              <a:buNone/>
-            </a:pPr>
-            <a:r>
-              <a:rPr lang="es-ES" sz="1600" b="1" noProof="0" dirty="0">
-                <a:solidFill>
-                  <a:srgbClr val="1E293B"/>
-                </a:solidFill>
-              </a:rPr>
-              <a:t>💾 Datos Simulados:</a:t>
-            </a:r>
-            <a:endParaRPr lang="es-ES" sz="1600" noProof="0" dirty="0"/>
-          </a:p>
-        </p:txBody>
-      </p:sp>
-      <p:sp>
-        <p:nvSpPr>
-          <p:cNvPr id="16" name="Shape 14"/>
-          <p:cNvSpPr/>
-          <p:nvPr/>
-        </p:nvSpPr>
-        <p:spPr>
-          <a:xfrm>
-            <a:off x="1371600" y="3200400"/>
-            <a:ext cx="6400800" cy="365760"/>
-          </a:xfrm>
-          <a:prstGeom prst="rect">
-            <a:avLst/>
-          </a:prstGeom>
-          <a:solidFill>
-            <a:srgbClr val="F1F5F9"/>
-          </a:solidFill>
-          <a:ln/>
-        </p:spPr>
-        <p:txBody>
-          <a:bodyPr/>
-          <a:lstStyle/>
-          <a:p>
-            <a:endParaRPr lang="es-ES" noProof="0" dirty="0"/>
-          </a:p>
-        </p:txBody>
-      </p:sp>
-      <p:sp>
-        <p:nvSpPr>
-          <p:cNvPr id="17" name="Text 15"/>
-          <p:cNvSpPr/>
-          <p:nvPr/>
-        </p:nvSpPr>
-        <p:spPr>
-          <a:xfrm>
-            <a:off x="1554480" y="3246120"/>
-            <a:ext cx="1828800" cy="274320"/>
-          </a:xfrm>
-          <a:prstGeom prst="rect">
-            <a:avLst/>
-          </a:prstGeom>
-          <a:noFill/>
-          <a:ln/>
-        </p:spPr>
-        <p:txBody>
-          <a:bodyPr wrap="square" rtlCol="0" anchor="ctr"/>
-          <a:lstStyle/>
-          <a:p>
-            <a:pPr marL="0" indent="0">
-              <a:buNone/>
-            </a:pPr>
-            <a:r>
-              <a:rPr lang="es-ES" sz="1300" b="1" noProof="0" dirty="0">
-                <a:solidFill>
-                  <a:srgbClr val="1E293B"/>
-                </a:solidFill>
-              </a:rPr>
-              <a:t>🌡️ Temperatura</a:t>
-            </a:r>
-            <a:endParaRPr lang="es-ES" sz="1300" noProof="0" dirty="0"/>
-          </a:p>
-        </p:txBody>
-      </p:sp>
-      <p:sp>
-        <p:nvSpPr>
-          <p:cNvPr id="18" name="Text 16"/>
-          <p:cNvSpPr/>
-          <p:nvPr/>
-        </p:nvSpPr>
-        <p:spPr>
-          <a:xfrm>
-            <a:off x="3474720" y="3246120"/>
-            <a:ext cx="2286000" cy="274320"/>
-          </a:xfrm>
-          <a:prstGeom prst="rect">
-            <a:avLst/>
-          </a:prstGeom>
-          <a:noFill/>
-          <a:ln/>
-        </p:spPr>
-        <p:txBody>
-          <a:bodyPr wrap="square" rtlCol="0" anchor="ctr"/>
-          <a:lstStyle/>
-          <a:p>
-            <a:pPr marL="0" indent="0">
-              <a:buNone/>
-            </a:pPr>
-            <a:r>
-              <a:rPr lang="es-ES" sz="1100" noProof="0" dirty="0">
-                <a:solidFill>
-                  <a:srgbClr val="64748B"/>
-                </a:solidFill>
-              </a:rPr>
-              <a:t>Rango: 18-30°C</a:t>
-            </a:r>
-            <a:endParaRPr lang="es-ES" sz="1100" noProof="0" dirty="0"/>
-          </a:p>
-        </p:txBody>
-      </p:sp>
-      <p:sp>
-        <p:nvSpPr>
-          <p:cNvPr id="19" name="Text 17"/>
-          <p:cNvSpPr/>
-          <p:nvPr/>
-        </p:nvSpPr>
-        <p:spPr>
-          <a:xfrm>
-            <a:off x="5943600" y="3246120"/>
-            <a:ext cx="1645920" cy="274320"/>
-          </a:xfrm>
-          <a:prstGeom prst="rect">
-            <a:avLst/>
-          </a:prstGeom>
-          <a:noFill/>
-          <a:ln/>
-        </p:spPr>
-        <p:txBody>
-          <a:bodyPr wrap="square" rtlCol="0" anchor="ctr"/>
-          <a:lstStyle/>
-          <a:p>
-            <a:pPr marL="0" indent="0">
-              <a:buNone/>
-            </a:pPr>
-            <a:r>
-              <a:rPr lang="es-ES" sz="1100" noProof="0" dirty="0">
-                <a:solidFill>
-                  <a:srgbClr val="028090"/>
-                </a:solidFill>
-              </a:rPr>
-              <a:t>Cada 5 </a:t>
-            </a:r>
-            <a:r>
-              <a:rPr lang="es-ES" sz="1100" noProof="0" dirty="0" err="1">
-                <a:solidFill>
-                  <a:srgbClr val="028090"/>
-                </a:solidFill>
-              </a:rPr>
-              <a:t>seg</a:t>
-            </a:r>
-            <a:endParaRPr lang="es-ES" sz="1100" noProof="0" dirty="0"/>
-          </a:p>
-        </p:txBody>
-      </p:sp>
-      <p:sp>
-        <p:nvSpPr>
-          <p:cNvPr id="20" name="Shape 18"/>
-          <p:cNvSpPr/>
-          <p:nvPr/>
-        </p:nvSpPr>
-        <p:spPr>
-          <a:xfrm>
-            <a:off x="1371600" y="3657600"/>
-            <a:ext cx="6400800" cy="365760"/>
-          </a:xfrm>
-          <a:prstGeom prst="rect">
-            <a:avLst/>
-          </a:prstGeom>
-          <a:solidFill>
-            <a:srgbClr val="F1F5F9"/>
-          </a:solidFill>
-          <a:ln/>
-        </p:spPr>
-        <p:txBody>
-          <a:bodyPr/>
-          <a:lstStyle/>
-          <a:p>
-            <a:endParaRPr lang="es-ES" noProof="0" dirty="0"/>
-          </a:p>
-        </p:txBody>
-      </p:sp>
-      <p:sp>
-        <p:nvSpPr>
-          <p:cNvPr id="21" name="Text 19"/>
-          <p:cNvSpPr/>
-          <p:nvPr/>
-        </p:nvSpPr>
-        <p:spPr>
-          <a:xfrm>
-            <a:off x="1554480" y="3703320"/>
-            <a:ext cx="1828800" cy="274320"/>
-          </a:xfrm>
-          <a:prstGeom prst="rect">
-            <a:avLst/>
-          </a:prstGeom>
-          <a:noFill/>
-          <a:ln/>
-        </p:spPr>
-        <p:txBody>
-          <a:bodyPr wrap="square" rtlCol="0" anchor="ctr"/>
-          <a:lstStyle/>
-          <a:p>
-            <a:pPr marL="0" indent="0">
-              <a:buNone/>
-            </a:pPr>
-            <a:r>
-              <a:rPr lang="es-ES" sz="1300" b="1" noProof="0" dirty="0">
-                <a:solidFill>
-                  <a:srgbClr val="1E293B"/>
-                </a:solidFill>
-              </a:rPr>
-              <a:t>💧 Humedad</a:t>
-            </a:r>
-            <a:endParaRPr lang="es-ES" sz="1300" noProof="0" dirty="0"/>
-          </a:p>
-        </p:txBody>
-      </p:sp>
-      <p:sp>
-        <p:nvSpPr>
-          <p:cNvPr id="22" name="Text 20"/>
-          <p:cNvSpPr/>
-          <p:nvPr/>
-        </p:nvSpPr>
-        <p:spPr>
-          <a:xfrm>
-            <a:off x="3474720" y="3703320"/>
-            <a:ext cx="2286000" cy="274320"/>
-          </a:xfrm>
-          <a:prstGeom prst="rect">
-            <a:avLst/>
-          </a:prstGeom>
-          <a:noFill/>
-          <a:ln/>
-        </p:spPr>
-        <p:txBody>
-          <a:bodyPr wrap="square" rtlCol="0" anchor="ctr"/>
-          <a:lstStyle/>
-          <a:p>
-            <a:pPr marL="0" indent="0">
-              <a:buNone/>
-            </a:pPr>
-            <a:r>
-              <a:rPr lang="es-ES" sz="1100" noProof="0" dirty="0">
-                <a:solidFill>
-                  <a:srgbClr val="64748B"/>
-                </a:solidFill>
-              </a:rPr>
-              <a:t>Rango: 40-80%</a:t>
-            </a:r>
-            <a:endParaRPr lang="es-ES" sz="1100" noProof="0" dirty="0"/>
-          </a:p>
-        </p:txBody>
-      </p:sp>
-      <p:sp>
-        <p:nvSpPr>
-          <p:cNvPr id="23" name="Text 21"/>
-          <p:cNvSpPr/>
-          <p:nvPr/>
-        </p:nvSpPr>
-        <p:spPr>
-          <a:xfrm>
-            <a:off x="5943600" y="3703320"/>
-            <a:ext cx="1645920" cy="274320"/>
-          </a:xfrm>
-          <a:prstGeom prst="rect">
-            <a:avLst/>
-          </a:prstGeom>
-          <a:noFill/>
-          <a:ln/>
-        </p:spPr>
-        <p:txBody>
-          <a:bodyPr wrap="square" rtlCol="0" anchor="ctr"/>
-          <a:lstStyle/>
-          <a:p>
-            <a:pPr marL="0" indent="0">
-              <a:buNone/>
-            </a:pPr>
-            <a:r>
-              <a:rPr lang="es-ES" sz="1100" noProof="0" dirty="0">
-                <a:solidFill>
-                  <a:srgbClr val="028090"/>
-                </a:solidFill>
-              </a:rPr>
-              <a:t>Cada 5 </a:t>
-            </a:r>
-            <a:r>
-              <a:rPr lang="es-ES" sz="1100" noProof="0" dirty="0" err="1">
-                <a:solidFill>
-                  <a:srgbClr val="028090"/>
-                </a:solidFill>
-              </a:rPr>
-              <a:t>seg</a:t>
-            </a:r>
-            <a:endParaRPr lang="es-ES" sz="1100" noProof="0" dirty="0"/>
-          </a:p>
-        </p:txBody>
-      </p:sp>
-      <p:sp>
-        <p:nvSpPr>
-          <p:cNvPr id="24" name="Shape 22"/>
-          <p:cNvSpPr/>
-          <p:nvPr/>
-        </p:nvSpPr>
-        <p:spPr>
-          <a:xfrm>
-            <a:off x="1371600" y="4114800"/>
-            <a:ext cx="6400800" cy="365760"/>
-          </a:xfrm>
-          <a:prstGeom prst="rect">
-            <a:avLst/>
-          </a:prstGeom>
-          <a:solidFill>
-            <a:srgbClr val="F1F5F9"/>
-          </a:solidFill>
-          <a:ln/>
-        </p:spPr>
-        <p:txBody>
-          <a:bodyPr/>
-          <a:lstStyle/>
-          <a:p>
-            <a:endParaRPr lang="es-ES" noProof="0" dirty="0"/>
-          </a:p>
-        </p:txBody>
-      </p:sp>
-      <p:sp>
-        <p:nvSpPr>
-          <p:cNvPr id="25" name="Text 23"/>
-          <p:cNvSpPr/>
-          <p:nvPr/>
-        </p:nvSpPr>
-        <p:spPr>
-          <a:xfrm>
-            <a:off x="1554480" y="4160520"/>
-            <a:ext cx="1828800" cy="274320"/>
-          </a:xfrm>
-          <a:prstGeom prst="rect">
-            <a:avLst/>
-          </a:prstGeom>
-          <a:noFill/>
-          <a:ln/>
-        </p:spPr>
-        <p:txBody>
-          <a:bodyPr wrap="square" rtlCol="0" anchor="ctr"/>
-          <a:lstStyle/>
-          <a:p>
-            <a:pPr marL="0" indent="0">
-              <a:buNone/>
-            </a:pPr>
-            <a:r>
-              <a:rPr lang="es-ES" sz="1300" b="1" noProof="0" dirty="0">
-                <a:solidFill>
-                  <a:srgbClr val="1E293B"/>
-                </a:solidFill>
-              </a:rPr>
-              <a:t>🔽 Presión</a:t>
-            </a:r>
-            <a:endParaRPr lang="es-ES" sz="1300" noProof="0" dirty="0"/>
-          </a:p>
-        </p:txBody>
-      </p:sp>
-      <p:sp>
-        <p:nvSpPr>
-          <p:cNvPr id="26" name="Text 24"/>
-          <p:cNvSpPr/>
-          <p:nvPr/>
-        </p:nvSpPr>
-        <p:spPr>
-          <a:xfrm>
-            <a:off x="3474720" y="4160520"/>
-            <a:ext cx="2286000" cy="274320"/>
-          </a:xfrm>
-          <a:prstGeom prst="rect">
-            <a:avLst/>
-          </a:prstGeom>
-          <a:noFill/>
-          <a:ln/>
-        </p:spPr>
-        <p:txBody>
-          <a:bodyPr wrap="square" rtlCol="0" anchor="ctr"/>
-          <a:lstStyle/>
-          <a:p>
-            <a:pPr marL="0" indent="0">
-              <a:buNone/>
-            </a:pPr>
-            <a:r>
-              <a:rPr lang="es-ES" sz="1100" noProof="0" dirty="0">
-                <a:solidFill>
-                  <a:srgbClr val="64748B"/>
-                </a:solidFill>
-              </a:rPr>
-              <a:t>Rango: 1010-1016 hPa</a:t>
-            </a:r>
-            <a:endParaRPr lang="es-ES" sz="1100" noProof="0" dirty="0"/>
-          </a:p>
-        </p:txBody>
-      </p:sp>
-      <p:sp>
-        <p:nvSpPr>
-          <p:cNvPr id="27" name="Text 25"/>
-          <p:cNvSpPr/>
-          <p:nvPr/>
-        </p:nvSpPr>
-        <p:spPr>
-          <a:xfrm>
-            <a:off x="5943600" y="4160520"/>
-            <a:ext cx="1645920" cy="274320"/>
-          </a:xfrm>
-          <a:prstGeom prst="rect">
-            <a:avLst/>
-          </a:prstGeom>
-          <a:noFill/>
-          <a:ln/>
-        </p:spPr>
-        <p:txBody>
-          <a:bodyPr wrap="square" rtlCol="0" anchor="ctr"/>
-          <a:lstStyle/>
-          <a:p>
-            <a:pPr marL="0" indent="0">
-              <a:buNone/>
-            </a:pPr>
-            <a:r>
-              <a:rPr lang="es-ES" sz="1100" noProof="0" dirty="0">
-                <a:solidFill>
-                  <a:srgbClr val="028090"/>
-                </a:solidFill>
-              </a:rPr>
-              <a:t>Cada 5 </a:t>
-            </a:r>
-            <a:r>
-              <a:rPr lang="es-ES" sz="1100" noProof="0" dirty="0" err="1">
-                <a:solidFill>
-                  <a:srgbClr val="028090"/>
-                </a:solidFill>
-              </a:rPr>
-              <a:t>seg</a:t>
-            </a:r>
-            <a:endParaRPr lang="es-ES" sz="1100" noProof="0" dirty="0"/>
-          </a:p>
-        </p:txBody>
-      </p:sp>
-    </p:spTree>
-  </p:cSld>
-  <p:clrMapOvr>
-    <a:masterClrMapping/>
-  </p:clrMapOvr>
-</p:sld>
-</file>
-
-<file path=ppt/slides/slide15.xml><?xml version="1.0" encoding="utf-8"?>
-<p:sld xmlns:a="http://schemas.openxmlformats.org/drawingml/2006/main" xmlns:r="http://schemas.openxmlformats.org/officeDocument/2006/relationships" xmlns:p="http://schemas.openxmlformats.org/presentationml/2006/main">
-  <p:cSld name="Slide 15">
-    <p:bg>
-      <p:bgPr>
-        <a:solidFill>
-          <a:srgbClr val="F8FAFC"/>
-        </a:solidFill>
-        <a:effectLst/>
-      </p:bgPr>
-    </p:bg>
-    <p:spTree>
-      <p:nvGrpSpPr>
-        <p:cNvPr id="1" name=""/>
-        <p:cNvGrpSpPr/>
-        <p:nvPr/>
-      </p:nvGrpSpPr>
-      <p:grpSpPr>
-        <a:xfrm>
-          <a:off x="0" y="0"/>
-          <a:ext cx="0" cy="0"/>
-          <a:chOff x="0" y="0"/>
-          <a:chExt cx="0" cy="0"/>
-        </a:xfrm>
-      </p:grpSpPr>
-      <p:sp>
-        <p:nvSpPr>
-          <p:cNvPr id="2" name="Text 0"/>
-          <p:cNvSpPr/>
-          <p:nvPr/>
-        </p:nvSpPr>
-        <p:spPr>
-          <a:xfrm>
-            <a:off x="457200" y="365760"/>
-            <a:ext cx="8229600" cy="548640"/>
-          </a:xfrm>
-          <a:prstGeom prst="rect">
-            <a:avLst/>
-          </a:prstGeom>
-          <a:noFill/>
-          <a:ln/>
-        </p:spPr>
-        <p:txBody>
-          <a:bodyPr wrap="square" lIns="0" tIns="0" rIns="0" bIns="0" rtlCol="0" anchor="ctr"/>
-          <a:lstStyle/>
-          <a:p>
-            <a:pPr marL="0" indent="0">
-              <a:buNone/>
-            </a:pPr>
-            <a:r>
-              <a:rPr lang="es-ES" sz="3600" b="1" noProof="0" dirty="0">
-                <a:solidFill>
-                  <a:srgbClr val="1E293B"/>
-                </a:solidFill>
-              </a:rPr>
-              <a:t>Aprendizajes Clave</a:t>
-            </a:r>
-            <a:endParaRPr lang="es-ES" sz="3600" noProof="0" dirty="0"/>
-          </a:p>
-        </p:txBody>
-      </p:sp>
-      <p:sp>
-        <p:nvSpPr>
-          <p:cNvPr id="3" name="Shape 1"/>
-          <p:cNvSpPr/>
-          <p:nvPr/>
-        </p:nvSpPr>
-        <p:spPr>
-          <a:xfrm>
-            <a:off x="731520" y="1280160"/>
-            <a:ext cx="3657600" cy="822960"/>
-          </a:xfrm>
-          <a:prstGeom prst="rect">
-            <a:avLst/>
-          </a:prstGeom>
-          <a:solidFill>
-            <a:srgbClr val="FFFFFF"/>
-          </a:solidFill>
-          <a:ln w="25400">
-            <a:solidFill>
-              <a:srgbClr val="028090"/>
-            </a:solidFill>
-            <a:prstDash val="solid"/>
-          </a:ln>
-        </p:spPr>
-        <p:txBody>
-          <a:bodyPr/>
-          <a:lstStyle/>
-          <a:p>
-            <a:endParaRPr lang="es-ES" noProof="0" dirty="0"/>
-          </a:p>
-        </p:txBody>
-      </p:sp>
-      <p:sp>
-        <p:nvSpPr>
-          <p:cNvPr id="4" name="Text 2"/>
-          <p:cNvSpPr/>
-          <p:nvPr/>
-        </p:nvSpPr>
-        <p:spPr>
-          <a:xfrm>
-            <a:off x="868680" y="1417320"/>
-            <a:ext cx="457200" cy="457200"/>
-          </a:xfrm>
-          <a:prstGeom prst="rect">
-            <a:avLst/>
-          </a:prstGeom>
-          <a:noFill/>
-          <a:ln/>
-        </p:spPr>
-        <p:txBody>
-          <a:bodyPr wrap="square" rtlCol="0" anchor="ctr"/>
-          <a:lstStyle/>
-          <a:p>
-            <a:pPr marL="0" indent="0">
-              <a:buNone/>
-            </a:pPr>
-            <a:r>
-              <a:rPr lang="es-ES" sz="3200" noProof="0" dirty="0">
-                <a:solidFill>
-                  <a:srgbClr val="000000"/>
-                </a:solidFill>
-              </a:rPr>
-              <a:t>🐳</a:t>
-            </a:r>
-            <a:endParaRPr lang="es-ES" sz="3200" noProof="0" dirty="0"/>
-          </a:p>
-        </p:txBody>
-      </p:sp>
-      <p:sp>
-        <p:nvSpPr>
-          <p:cNvPr id="5" name="Text 3"/>
-          <p:cNvSpPr/>
-          <p:nvPr/>
-        </p:nvSpPr>
-        <p:spPr>
-          <a:xfrm>
-            <a:off x="1463040" y="1389888"/>
-            <a:ext cx="2743200" cy="228600"/>
-          </a:xfrm>
-          <a:prstGeom prst="rect">
-            <a:avLst/>
-          </a:prstGeom>
-          <a:noFill/>
-          <a:ln/>
-        </p:spPr>
-        <p:txBody>
-          <a:bodyPr wrap="square" rtlCol="0" anchor="ctr"/>
-          <a:lstStyle/>
-          <a:p>
-            <a:pPr marL="0" indent="0">
-              <a:buNone/>
-            </a:pPr>
-            <a:r>
-              <a:rPr lang="es-ES" sz="1400" b="1" noProof="0" dirty="0">
-                <a:solidFill>
-                  <a:srgbClr val="1E293B"/>
-                </a:solidFill>
-              </a:rPr>
-              <a:t>Docker </a:t>
-            </a:r>
-            <a:r>
-              <a:rPr lang="es-ES" sz="1400" b="1" noProof="0" dirty="0" err="1">
-                <a:solidFill>
-                  <a:srgbClr val="1E293B"/>
-                </a:solidFill>
-              </a:rPr>
-              <a:t>Compose</a:t>
-            </a:r>
-            <a:endParaRPr lang="es-ES" sz="1400" noProof="0" dirty="0"/>
-          </a:p>
-        </p:txBody>
-      </p:sp>
-      <p:sp>
-        <p:nvSpPr>
-          <p:cNvPr id="6" name="Text 4"/>
-          <p:cNvSpPr/>
-          <p:nvPr/>
-        </p:nvSpPr>
-        <p:spPr>
-          <a:xfrm>
-            <a:off x="1463040" y="1691640"/>
-            <a:ext cx="2743200" cy="320040"/>
-          </a:xfrm>
-          <a:prstGeom prst="rect">
-            <a:avLst/>
-          </a:prstGeom>
-          <a:noFill/>
-          <a:ln/>
-        </p:spPr>
-        <p:txBody>
-          <a:bodyPr wrap="square" rtlCol="0" anchor="ctr"/>
-          <a:lstStyle/>
-          <a:p>
-            <a:pPr marL="0" indent="0">
-              <a:buNone/>
-            </a:pPr>
-            <a:r>
-              <a:rPr lang="es-ES" sz="1100" noProof="0" dirty="0">
-                <a:solidFill>
-                  <a:srgbClr val="64748B"/>
-                </a:solidFill>
-              </a:rPr>
-              <a:t>Orquestación de múltiples contenedores con un solo comando</a:t>
-            </a:r>
-            <a:endParaRPr lang="es-ES" sz="1100" noProof="0" dirty="0"/>
-          </a:p>
-        </p:txBody>
-      </p:sp>
-      <p:sp>
-        <p:nvSpPr>
-          <p:cNvPr id="7" name="Shape 5"/>
-          <p:cNvSpPr/>
-          <p:nvPr/>
-        </p:nvSpPr>
-        <p:spPr>
-          <a:xfrm>
-            <a:off x="4846320" y="1280160"/>
-            <a:ext cx="3657600" cy="822960"/>
-          </a:xfrm>
-          <a:prstGeom prst="rect">
-            <a:avLst/>
-          </a:prstGeom>
-          <a:solidFill>
-            <a:srgbClr val="FFFFFF"/>
-          </a:solidFill>
-          <a:ln w="25400">
-            <a:solidFill>
-              <a:srgbClr val="028090"/>
-            </a:solidFill>
-            <a:prstDash val="solid"/>
-          </a:ln>
-        </p:spPr>
-        <p:txBody>
-          <a:bodyPr/>
-          <a:lstStyle/>
-          <a:p>
-            <a:endParaRPr lang="es-ES" noProof="0" dirty="0"/>
-          </a:p>
-        </p:txBody>
-      </p:sp>
-      <p:sp>
-        <p:nvSpPr>
-          <p:cNvPr id="8" name="Text 6"/>
-          <p:cNvSpPr/>
-          <p:nvPr/>
-        </p:nvSpPr>
-        <p:spPr>
-          <a:xfrm>
-            <a:off x="4983480" y="1417320"/>
-            <a:ext cx="457200" cy="457200"/>
-          </a:xfrm>
-          <a:prstGeom prst="rect">
-            <a:avLst/>
-          </a:prstGeom>
-          <a:noFill/>
-          <a:ln/>
-        </p:spPr>
-        <p:txBody>
-          <a:bodyPr wrap="square" rtlCol="0" anchor="ctr"/>
-          <a:lstStyle/>
-          <a:p>
-            <a:pPr marL="0" indent="0">
-              <a:buNone/>
-            </a:pPr>
-            <a:r>
-              <a:rPr lang="es-ES" sz="3200" noProof="0" dirty="0">
-                <a:solidFill>
-                  <a:srgbClr val="000000"/>
-                </a:solidFill>
-              </a:rPr>
-              <a:t>🌐</a:t>
-            </a:r>
-            <a:endParaRPr lang="es-ES" sz="3200" noProof="0" dirty="0"/>
-          </a:p>
-        </p:txBody>
-      </p:sp>
-      <p:sp>
-        <p:nvSpPr>
-          <p:cNvPr id="9" name="Text 7"/>
-          <p:cNvSpPr/>
-          <p:nvPr/>
-        </p:nvSpPr>
-        <p:spPr>
-          <a:xfrm>
-            <a:off x="5577840" y="1389888"/>
-            <a:ext cx="2743200" cy="228600"/>
-          </a:xfrm>
-          <a:prstGeom prst="rect">
-            <a:avLst/>
-          </a:prstGeom>
-          <a:noFill/>
-          <a:ln/>
-        </p:spPr>
-        <p:txBody>
-          <a:bodyPr wrap="square" rtlCol="0" anchor="ctr"/>
-          <a:lstStyle/>
-          <a:p>
-            <a:pPr marL="0" indent="0">
-              <a:buNone/>
-            </a:pPr>
-            <a:r>
-              <a:rPr lang="es-ES" sz="1400" b="1" noProof="0" dirty="0">
-                <a:solidFill>
-                  <a:srgbClr val="1E293B"/>
-                </a:solidFill>
-              </a:rPr>
-              <a:t>Redes Docker</a:t>
-            </a:r>
-            <a:endParaRPr lang="es-ES" sz="1400" noProof="0" dirty="0"/>
-          </a:p>
-        </p:txBody>
-      </p:sp>
-      <p:sp>
-        <p:nvSpPr>
-          <p:cNvPr id="10" name="Text 8"/>
-          <p:cNvSpPr/>
-          <p:nvPr/>
-        </p:nvSpPr>
-        <p:spPr>
-          <a:xfrm>
-            <a:off x="5577840" y="1691640"/>
-            <a:ext cx="2743200" cy="320040"/>
-          </a:xfrm>
-          <a:prstGeom prst="rect">
-            <a:avLst/>
-          </a:prstGeom>
-          <a:noFill/>
-          <a:ln/>
-        </p:spPr>
-        <p:txBody>
-          <a:bodyPr wrap="square" rtlCol="0" anchor="ctr"/>
-          <a:lstStyle/>
-          <a:p>
-            <a:pPr marL="0" indent="0">
-              <a:buNone/>
-            </a:pPr>
-            <a:r>
-              <a:rPr lang="es-ES" sz="1100" noProof="0" dirty="0">
-                <a:solidFill>
-                  <a:srgbClr val="64748B"/>
-                </a:solidFill>
-              </a:rPr>
-              <a:t>Comunicación entre contenedores mediante DNS interno</a:t>
-            </a:r>
-            <a:endParaRPr lang="es-ES" sz="1100" noProof="0" dirty="0"/>
-          </a:p>
-        </p:txBody>
-      </p:sp>
-      <p:sp>
-        <p:nvSpPr>
-          <p:cNvPr id="11" name="Shape 9"/>
-          <p:cNvSpPr/>
-          <p:nvPr/>
-        </p:nvSpPr>
-        <p:spPr>
-          <a:xfrm>
-            <a:off x="731520" y="2377440"/>
-            <a:ext cx="3657600" cy="822960"/>
-          </a:xfrm>
-          <a:prstGeom prst="rect">
-            <a:avLst/>
-          </a:prstGeom>
-          <a:solidFill>
-            <a:srgbClr val="FFFFFF"/>
-          </a:solidFill>
-          <a:ln w="25400">
-            <a:solidFill>
-              <a:srgbClr val="028090"/>
-            </a:solidFill>
-            <a:prstDash val="solid"/>
-          </a:ln>
-        </p:spPr>
-        <p:txBody>
-          <a:bodyPr/>
-          <a:lstStyle/>
-          <a:p>
-            <a:endParaRPr lang="es-ES" noProof="0" dirty="0"/>
-          </a:p>
-        </p:txBody>
-      </p:sp>
-      <p:sp>
-        <p:nvSpPr>
-          <p:cNvPr id="12" name="Text 10"/>
-          <p:cNvSpPr/>
-          <p:nvPr/>
-        </p:nvSpPr>
-        <p:spPr>
-          <a:xfrm>
-            <a:off x="868680" y="2514600"/>
-            <a:ext cx="457200" cy="457200"/>
-          </a:xfrm>
-          <a:prstGeom prst="rect">
-            <a:avLst/>
-          </a:prstGeom>
-          <a:noFill/>
-          <a:ln/>
-        </p:spPr>
-        <p:txBody>
-          <a:bodyPr wrap="square" rtlCol="0" anchor="ctr"/>
-          <a:lstStyle/>
-          <a:p>
-            <a:pPr marL="0" indent="0">
-              <a:buNone/>
-            </a:pPr>
-            <a:r>
-              <a:rPr lang="es-ES" sz="3200" noProof="0" dirty="0">
-                <a:solidFill>
-                  <a:srgbClr val="000000"/>
-                </a:solidFill>
-              </a:rPr>
-              <a:t>💾</a:t>
-            </a:r>
-            <a:endParaRPr lang="es-ES" sz="3200" noProof="0" dirty="0"/>
-          </a:p>
-        </p:txBody>
-      </p:sp>
-      <p:sp>
-        <p:nvSpPr>
-          <p:cNvPr id="13" name="Text 11"/>
-          <p:cNvSpPr/>
-          <p:nvPr/>
-        </p:nvSpPr>
-        <p:spPr>
-          <a:xfrm>
-            <a:off x="1463040" y="2487168"/>
-            <a:ext cx="2743200" cy="228600"/>
-          </a:xfrm>
-          <a:prstGeom prst="rect">
-            <a:avLst/>
-          </a:prstGeom>
-          <a:noFill/>
-          <a:ln/>
-        </p:spPr>
-        <p:txBody>
-          <a:bodyPr wrap="square" rtlCol="0" anchor="ctr"/>
-          <a:lstStyle/>
-          <a:p>
-            <a:pPr marL="0" indent="0">
-              <a:buNone/>
-            </a:pPr>
-            <a:r>
-              <a:rPr lang="es-ES" sz="1400" b="1" noProof="0" dirty="0">
-                <a:solidFill>
-                  <a:srgbClr val="1E293B"/>
-                </a:solidFill>
-              </a:rPr>
-              <a:t>Persistencia</a:t>
-            </a:r>
-            <a:endParaRPr lang="es-ES" sz="1400" noProof="0" dirty="0"/>
-          </a:p>
-        </p:txBody>
-      </p:sp>
-      <p:sp>
-        <p:nvSpPr>
-          <p:cNvPr id="14" name="Text 12"/>
-          <p:cNvSpPr/>
-          <p:nvPr/>
-        </p:nvSpPr>
-        <p:spPr>
-          <a:xfrm>
-            <a:off x="1463040" y="2788920"/>
-            <a:ext cx="2743200" cy="320040"/>
-          </a:xfrm>
-          <a:prstGeom prst="rect">
-            <a:avLst/>
-          </a:prstGeom>
-          <a:noFill/>
-          <a:ln/>
-        </p:spPr>
-        <p:txBody>
-          <a:bodyPr wrap="square" rtlCol="0" anchor="ctr"/>
-          <a:lstStyle/>
-          <a:p>
-            <a:pPr marL="0" indent="0">
-              <a:buNone/>
-            </a:pPr>
-            <a:r>
-              <a:rPr lang="es-ES" sz="1100" noProof="0" dirty="0">
-                <a:solidFill>
-                  <a:srgbClr val="64748B"/>
-                </a:solidFill>
-              </a:rPr>
-              <a:t>Uso de volúmenes para mantener datos entre reinicios</a:t>
-            </a:r>
-            <a:endParaRPr lang="es-ES" sz="1100" noProof="0" dirty="0"/>
-          </a:p>
-        </p:txBody>
-      </p:sp>
-      <p:sp>
-        <p:nvSpPr>
-          <p:cNvPr id="15" name="Shape 13"/>
-          <p:cNvSpPr/>
-          <p:nvPr/>
-        </p:nvSpPr>
-        <p:spPr>
-          <a:xfrm>
-            <a:off x="4846320" y="2377440"/>
-            <a:ext cx="3657600" cy="822960"/>
-          </a:xfrm>
-          <a:prstGeom prst="rect">
-            <a:avLst/>
-          </a:prstGeom>
-          <a:solidFill>
-            <a:srgbClr val="FFFFFF"/>
-          </a:solidFill>
-          <a:ln w="25400">
-            <a:solidFill>
-              <a:srgbClr val="028090"/>
-            </a:solidFill>
-            <a:prstDash val="solid"/>
-          </a:ln>
-        </p:spPr>
-        <p:txBody>
-          <a:bodyPr/>
-          <a:lstStyle/>
-          <a:p>
-            <a:endParaRPr lang="es-ES" noProof="0" dirty="0"/>
-          </a:p>
-        </p:txBody>
-      </p:sp>
-      <p:sp>
-        <p:nvSpPr>
-          <p:cNvPr id="16" name="Text 14"/>
-          <p:cNvSpPr/>
-          <p:nvPr/>
-        </p:nvSpPr>
-        <p:spPr>
-          <a:xfrm>
-            <a:off x="4983480" y="2514600"/>
-            <a:ext cx="457200" cy="457200"/>
-          </a:xfrm>
-          <a:prstGeom prst="rect">
-            <a:avLst/>
-          </a:prstGeom>
-          <a:noFill/>
-          <a:ln/>
-        </p:spPr>
-        <p:txBody>
-          <a:bodyPr wrap="square" rtlCol="0" anchor="ctr"/>
-          <a:lstStyle/>
-          <a:p>
-            <a:pPr marL="0" indent="0">
-              <a:buNone/>
-            </a:pPr>
-            <a:r>
-              <a:rPr lang="es-ES" sz="3200" noProof="0" dirty="0">
-                <a:solidFill>
-                  <a:srgbClr val="000000"/>
-                </a:solidFill>
-              </a:rPr>
-              <a:t>⚙️</a:t>
-            </a:r>
-            <a:endParaRPr lang="es-ES" sz="3200" noProof="0" dirty="0"/>
-          </a:p>
-        </p:txBody>
-      </p:sp>
-      <p:sp>
-        <p:nvSpPr>
-          <p:cNvPr id="17" name="Text 15"/>
-          <p:cNvSpPr/>
-          <p:nvPr/>
-        </p:nvSpPr>
-        <p:spPr>
-          <a:xfrm>
-            <a:off x="5577840" y="2487168"/>
-            <a:ext cx="2743200" cy="228600"/>
-          </a:xfrm>
-          <a:prstGeom prst="rect">
-            <a:avLst/>
-          </a:prstGeom>
-          <a:noFill/>
-          <a:ln/>
-        </p:spPr>
-        <p:txBody>
-          <a:bodyPr wrap="square" rtlCol="0" anchor="ctr"/>
-          <a:lstStyle/>
-          <a:p>
-            <a:pPr marL="0" indent="0">
-              <a:buNone/>
-            </a:pPr>
-            <a:r>
-              <a:rPr lang="es-ES" sz="1400" b="1" noProof="0" dirty="0" err="1">
-                <a:solidFill>
-                  <a:srgbClr val="1E293B"/>
-                </a:solidFill>
-              </a:rPr>
-              <a:t>Provisioning</a:t>
-            </a:r>
-            <a:endParaRPr lang="es-ES" sz="1400" noProof="0" dirty="0"/>
-          </a:p>
-        </p:txBody>
-      </p:sp>
-      <p:sp>
-        <p:nvSpPr>
-          <p:cNvPr id="18" name="Text 16"/>
-          <p:cNvSpPr/>
-          <p:nvPr/>
-        </p:nvSpPr>
-        <p:spPr>
-          <a:xfrm>
-            <a:off x="5577840" y="2788920"/>
-            <a:ext cx="2743200" cy="320040"/>
-          </a:xfrm>
-          <a:prstGeom prst="rect">
-            <a:avLst/>
-          </a:prstGeom>
-          <a:noFill/>
-          <a:ln/>
-        </p:spPr>
-        <p:txBody>
-          <a:bodyPr wrap="square" rtlCol="0" anchor="ctr"/>
-          <a:lstStyle/>
-          <a:p>
-            <a:pPr marL="0" indent="0">
-              <a:buNone/>
-            </a:pPr>
-            <a:r>
-              <a:rPr lang="es-ES" sz="1100" noProof="0" dirty="0">
-                <a:solidFill>
-                  <a:srgbClr val="64748B"/>
-                </a:solidFill>
-              </a:rPr>
-              <a:t>Configuración como código para automatización completa</a:t>
-            </a:r>
-            <a:endParaRPr lang="es-ES" sz="1100" noProof="0" dirty="0"/>
-          </a:p>
-        </p:txBody>
-      </p:sp>
-      <p:sp>
-        <p:nvSpPr>
-          <p:cNvPr id="19" name="Shape 17"/>
-          <p:cNvSpPr/>
-          <p:nvPr/>
-        </p:nvSpPr>
-        <p:spPr>
-          <a:xfrm>
-            <a:off x="731520" y="3474720"/>
-            <a:ext cx="3657600" cy="822960"/>
-          </a:xfrm>
-          <a:prstGeom prst="rect">
-            <a:avLst/>
-          </a:prstGeom>
-          <a:solidFill>
-            <a:srgbClr val="FFFFFF"/>
-          </a:solidFill>
-          <a:ln w="25400">
-            <a:solidFill>
-              <a:srgbClr val="028090"/>
-            </a:solidFill>
-            <a:prstDash val="solid"/>
-          </a:ln>
-        </p:spPr>
-        <p:txBody>
-          <a:bodyPr/>
-          <a:lstStyle/>
-          <a:p>
-            <a:endParaRPr lang="es-ES" noProof="0" dirty="0"/>
-          </a:p>
-        </p:txBody>
-      </p:sp>
-      <p:sp>
-        <p:nvSpPr>
-          <p:cNvPr id="20" name="Text 18"/>
-          <p:cNvSpPr/>
-          <p:nvPr/>
-        </p:nvSpPr>
-        <p:spPr>
-          <a:xfrm>
-            <a:off x="868680" y="3611880"/>
-            <a:ext cx="457200" cy="457200"/>
-          </a:xfrm>
-          <a:prstGeom prst="rect">
-            <a:avLst/>
-          </a:prstGeom>
-          <a:noFill/>
-          <a:ln/>
-        </p:spPr>
-        <p:txBody>
-          <a:bodyPr wrap="square" rtlCol="0" anchor="ctr"/>
-          <a:lstStyle/>
-          <a:p>
-            <a:pPr marL="0" indent="0">
-              <a:buNone/>
-            </a:pPr>
-            <a:r>
-              <a:rPr lang="es-ES" sz="3200" noProof="0" dirty="0">
-                <a:solidFill>
-                  <a:srgbClr val="000000"/>
-                </a:solidFill>
-              </a:rPr>
-              <a:t>🔧</a:t>
-            </a:r>
-            <a:endParaRPr lang="es-ES" sz="3200" noProof="0" dirty="0"/>
-          </a:p>
-        </p:txBody>
-      </p:sp>
-      <p:sp>
-        <p:nvSpPr>
-          <p:cNvPr id="21" name="Text 19"/>
-          <p:cNvSpPr/>
-          <p:nvPr/>
-        </p:nvSpPr>
-        <p:spPr>
-          <a:xfrm>
-            <a:off x="1463040" y="3584448"/>
-            <a:ext cx="2743200" cy="228600"/>
-          </a:xfrm>
-          <a:prstGeom prst="rect">
-            <a:avLst/>
-          </a:prstGeom>
-          <a:noFill/>
-          <a:ln/>
-        </p:spPr>
-        <p:txBody>
-          <a:bodyPr wrap="square" rtlCol="0" anchor="ctr"/>
-          <a:lstStyle/>
-          <a:p>
-            <a:pPr marL="0" indent="0">
-              <a:buNone/>
-            </a:pPr>
-            <a:r>
-              <a:rPr lang="es-ES" sz="1400" b="1" noProof="0" dirty="0" err="1">
-                <a:solidFill>
-                  <a:srgbClr val="1E293B"/>
-                </a:solidFill>
-              </a:rPr>
-              <a:t>Debugging</a:t>
-            </a:r>
-            <a:endParaRPr lang="es-ES" sz="1400" noProof="0" dirty="0"/>
-          </a:p>
-        </p:txBody>
-      </p:sp>
-      <p:sp>
-        <p:nvSpPr>
-          <p:cNvPr id="22" name="Text 20"/>
-          <p:cNvSpPr/>
-          <p:nvPr/>
-        </p:nvSpPr>
-        <p:spPr>
-          <a:xfrm>
-            <a:off x="1463040" y="3886200"/>
-            <a:ext cx="2743200" cy="320040"/>
-          </a:xfrm>
-          <a:prstGeom prst="rect">
-            <a:avLst/>
-          </a:prstGeom>
-          <a:noFill/>
-          <a:ln/>
-        </p:spPr>
-        <p:txBody>
-          <a:bodyPr wrap="square" rtlCol="0" anchor="ctr"/>
-          <a:lstStyle/>
-          <a:p>
-            <a:pPr marL="0" indent="0">
-              <a:buNone/>
-            </a:pPr>
-            <a:r>
-              <a:rPr lang="es-ES" sz="1100" noProof="0" dirty="0">
-                <a:solidFill>
-                  <a:srgbClr val="64748B"/>
-                </a:solidFill>
-              </a:rPr>
-              <a:t>Resolución de problemas de conectividad y configuración</a:t>
-            </a:r>
-            <a:endParaRPr lang="es-ES" sz="1100" noProof="0" dirty="0"/>
-          </a:p>
-        </p:txBody>
-      </p:sp>
-      <p:sp>
-        <p:nvSpPr>
-          <p:cNvPr id="23" name="Shape 21"/>
-          <p:cNvSpPr/>
-          <p:nvPr/>
-        </p:nvSpPr>
-        <p:spPr>
-          <a:xfrm>
-            <a:off x="4846320" y="3474720"/>
-            <a:ext cx="3657600" cy="822960"/>
-          </a:xfrm>
-          <a:prstGeom prst="rect">
-            <a:avLst/>
-          </a:prstGeom>
-          <a:solidFill>
-            <a:srgbClr val="FFFFFF"/>
-          </a:solidFill>
-          <a:ln w="25400">
-            <a:solidFill>
-              <a:srgbClr val="028090"/>
-            </a:solidFill>
-            <a:prstDash val="solid"/>
-          </a:ln>
-        </p:spPr>
-        <p:txBody>
-          <a:bodyPr/>
-          <a:lstStyle/>
-          <a:p>
-            <a:endParaRPr lang="es-ES" noProof="0" dirty="0"/>
-          </a:p>
-        </p:txBody>
-      </p:sp>
-      <p:sp>
-        <p:nvSpPr>
-          <p:cNvPr id="24" name="Text 22"/>
-          <p:cNvSpPr/>
-          <p:nvPr/>
-        </p:nvSpPr>
-        <p:spPr>
-          <a:xfrm>
-            <a:off x="4983480" y="3611880"/>
-            <a:ext cx="457200" cy="457200"/>
-          </a:xfrm>
-          <a:prstGeom prst="rect">
-            <a:avLst/>
-          </a:prstGeom>
-          <a:noFill/>
-          <a:ln/>
-        </p:spPr>
-        <p:txBody>
-          <a:bodyPr wrap="square" rtlCol="0" anchor="ctr"/>
-          <a:lstStyle/>
-          <a:p>
-            <a:pPr marL="0" indent="0">
-              <a:buNone/>
-            </a:pPr>
-            <a:r>
-              <a:rPr lang="es-ES" sz="3200" noProof="0" dirty="0">
-                <a:solidFill>
-                  <a:srgbClr val="000000"/>
-                </a:solidFill>
-              </a:rPr>
-              <a:t>📊</a:t>
-            </a:r>
-            <a:endParaRPr lang="es-ES" sz="3200" noProof="0" dirty="0"/>
-          </a:p>
-        </p:txBody>
-      </p:sp>
-      <p:sp>
-        <p:nvSpPr>
-          <p:cNvPr id="25" name="Text 23"/>
-          <p:cNvSpPr/>
-          <p:nvPr/>
-        </p:nvSpPr>
-        <p:spPr>
-          <a:xfrm>
-            <a:off x="5577840" y="3584448"/>
-            <a:ext cx="2743200" cy="228600"/>
-          </a:xfrm>
-          <a:prstGeom prst="rect">
-            <a:avLst/>
-          </a:prstGeom>
-          <a:noFill/>
-          <a:ln/>
-        </p:spPr>
-        <p:txBody>
-          <a:bodyPr wrap="square" rtlCol="0" anchor="ctr"/>
-          <a:lstStyle/>
-          <a:p>
-            <a:pPr marL="0" indent="0">
-              <a:buNone/>
-            </a:pPr>
-            <a:r>
-              <a:rPr lang="es-ES" sz="1400" b="1" noProof="0" dirty="0">
-                <a:solidFill>
-                  <a:srgbClr val="1E293B"/>
-                </a:solidFill>
-              </a:rPr>
-              <a:t>Series Temporales</a:t>
-            </a:r>
-            <a:endParaRPr lang="es-ES" sz="1400" noProof="0" dirty="0"/>
-          </a:p>
-        </p:txBody>
-      </p:sp>
-      <p:sp>
-        <p:nvSpPr>
-          <p:cNvPr id="26" name="Text 24"/>
-          <p:cNvSpPr/>
-          <p:nvPr/>
-        </p:nvSpPr>
-        <p:spPr>
-          <a:xfrm>
-            <a:off x="5577840" y="3886200"/>
-            <a:ext cx="2743200" cy="320040"/>
-          </a:xfrm>
-          <a:prstGeom prst="rect">
-            <a:avLst/>
-          </a:prstGeom>
-          <a:noFill/>
-          <a:ln/>
-        </p:spPr>
-        <p:txBody>
-          <a:bodyPr wrap="square" rtlCol="0" anchor="ctr"/>
-          <a:lstStyle/>
-          <a:p>
-            <a:pPr marL="0" indent="0">
-              <a:buNone/>
-            </a:pPr>
-            <a:r>
-              <a:rPr lang="es-ES" sz="1100" noProof="0" dirty="0">
-                <a:solidFill>
-                  <a:srgbClr val="64748B"/>
-                </a:solidFill>
-              </a:rPr>
-              <a:t>Uso de </a:t>
-            </a:r>
-            <a:r>
-              <a:rPr lang="es-ES" sz="1100" noProof="0" dirty="0" err="1">
-                <a:solidFill>
-                  <a:srgbClr val="64748B"/>
-                </a:solidFill>
-              </a:rPr>
-              <a:t>InfluxDB</a:t>
-            </a:r>
-            <a:r>
-              <a:rPr lang="es-ES" sz="1100" noProof="0" dirty="0">
-                <a:solidFill>
-                  <a:srgbClr val="64748B"/>
-                </a:solidFill>
-              </a:rPr>
-              <a:t> especializada para datos </a:t>
-            </a:r>
-            <a:r>
-              <a:rPr lang="es-ES" sz="1100" noProof="0" dirty="0" err="1">
-                <a:solidFill>
-                  <a:srgbClr val="64748B"/>
-                </a:solidFill>
-              </a:rPr>
-              <a:t>IoT</a:t>
-            </a:r>
-            <a:endParaRPr lang="es-ES" sz="1100" noProof="0" dirty="0"/>
-          </a:p>
-        </p:txBody>
-      </p:sp>
-    </p:spTree>
-  </p:cSld>
-  <p:clrMapOvr>
-    <a:masterClrMapping/>
-  </p:clrMapOvr>
-</p:sld>
-</file>
-
-<file path=ppt/slides/slide16.xml><?xml version="1.0" encoding="utf-8"?>
 <p:sld xmlns:a="http://schemas.openxmlformats.org/drawingml/2006/main" xmlns:r="http://schemas.openxmlformats.org/officeDocument/2006/relationships" xmlns:p="http://schemas.openxmlformats.org/presentationml/2006/main">
   <p:cSld name="Slide 16">
     <p:bg>
@@ -7792,7 +5717,7 @@
 </p:sld>
 </file>
 
-<file path=ppt/slides/slide17.xml><?xml version="1.0" encoding="utf-8"?>
+<file path=ppt/slides/slide15.xml><?xml version="1.0" encoding="utf-8"?>
 <p:sld xmlns:a="http://schemas.openxmlformats.org/drawingml/2006/main" xmlns:r="http://schemas.openxmlformats.org/officeDocument/2006/relationships" xmlns:p="http://schemas.openxmlformats.org/presentationml/2006/main">
   <p:cSld name="Slide 17">
     <p:bg>
@@ -8319,7 +6244,7 @@
 </p:sld>
 </file>
 
-<file path=ppt/slides/slide18.xml><?xml version="1.0" encoding="utf-8"?>
+<file path=ppt/slides/slide16.xml><?xml version="1.0" encoding="utf-8"?>
 <p:sld xmlns:a="http://schemas.openxmlformats.org/drawingml/2006/main" xmlns:r="http://schemas.openxmlformats.org/officeDocument/2006/relationships" xmlns:p="http://schemas.openxmlformats.org/presentationml/2006/main">
   <p:cSld name="Slide 18">
     <p:bg>
@@ -11396,28 +9321,6 @@
               </a:rPr>
               <a:t>iot</a:t>
             </a:r>
-            <a:r>
-              <a:rPr lang="es-ES" sz="800" noProof="0" dirty="0">
-                <a:solidFill>
-                  <a:srgbClr val="D1FAE5"/>
-                </a:solidFill>
-                <a:latin typeface="Courier New" pitchFamily="34" charset="0"/>
-                <a:ea typeface="Courier New" pitchFamily="34" charset="-122"/>
-                <a:cs typeface="Courier New" pitchFamily="34" charset="-120"/>
-              </a:rPr>
-              <a:t>-</a:t>
-            </a:r>
-            <a:r>
-              <a:rPr lang="es-ES" sz="800" noProof="0" dirty="0" err="1">
-                <a:solidFill>
-                  <a:srgbClr val="D1FAE5"/>
-                </a:solidFill>
-                <a:latin typeface="Courier New" pitchFamily="34" charset="0"/>
-                <a:ea typeface="Courier New" pitchFamily="34" charset="-122"/>
-                <a:cs typeface="Courier New" pitchFamily="34" charset="-120"/>
-              </a:rPr>
-              <a:t>docker</a:t>
-            </a:r>
             <a:endParaRPr lang="es-ES" sz="800" noProof="0" dirty="0"/>
           </a:p>
           <a:p>
@@ -11448,28 +9351,6 @@
                 <a:cs typeface="Courier New" pitchFamily="34" charset="-120"/>
               </a:rPr>
               <a:t>iot</a:t>
-            </a:r>
-            <a:r>
-              <a:rPr lang="es-ES" sz="800" noProof="0" dirty="0">
-                <a:solidFill>
-                  <a:srgbClr val="D1FAE5"/>
-                </a:solidFill>
-                <a:latin typeface="Courier New" pitchFamily="34" charset="0"/>
-                <a:ea typeface="Courier New" pitchFamily="34" charset="-122"/>
-                <a:cs typeface="Courier New" pitchFamily="34" charset="-120"/>
-              </a:rPr>
-              <a:t>-</a:t>
-            </a:r>
-            <a:r>
-              <a:rPr lang="es-ES" sz="800" noProof="0" dirty="0" err="1">
-                <a:solidFill>
-                  <a:srgbClr val="D1FAE5"/>
-                </a:solidFill>
-                <a:latin typeface="Courier New" pitchFamily="34" charset="0"/>
-                <a:ea typeface="Courier New" pitchFamily="34" charset="-122"/>
-                <a:cs typeface="Courier New" pitchFamily="34" charset="-120"/>
-              </a:rPr>
-              <a:t>docker</a:t>
             </a:r>
             <a:endParaRPr lang="es-ES" sz="800" noProof="0" dirty="0"/>
           </a:p>
@@ -11763,11 +9644,10 @@
             <a:endParaRPr lang="es-ES" sz="800" noProof="0" dirty="0"/>
           </a:p>
           <a:p>
-            <a:pPr marL="0" indent="0">
+            <a:pPr>
               <a:lnSpc>
                 <a:spcPts val="1000"/>
               </a:lnSpc>
-              <a:buNone/>
             </a:pPr>
             <a:r>
               <a:rPr lang="es-ES" sz="800" noProof="0" dirty="0" err="1">
@@ -11833,7 +9713,18 @@
                 <a:ea typeface="Courier New" pitchFamily="34" charset="-122"/>
                 <a:cs typeface="Courier New" pitchFamily="34" charset="-120"/>
               </a:rPr>
-              <a:t> [URL]</a:t>
+              <a:t> </a:t>
+            </a:r>
+            <a:r>
+              <a:rPr lang="es-ES" sz="800" dirty="0">
+                <a:solidFill>
+                  <a:srgbClr val="D1FAE5"/>
+                </a:solidFill>
+                <a:latin typeface="Courier New" pitchFamily="34" charset="0"/>
+                <a:ea typeface="Courier New" pitchFamily="34" charset="-122"/>
+                <a:cs typeface="Courier New" pitchFamily="34" charset="-120"/>
+              </a:rPr>
+              <a:t>https://github.com/Jon8a/proyecto-iot</a:t>
             </a:r>
             <a:endParaRPr lang="es-ES" sz="800" noProof="0" dirty="0"/>
           </a:p>

</xml_diff>